<commit_message>
made change for bullet points
</commit_message>
<xml_diff>
--- a/blank.pptx
+++ b/blank.pptx
@@ -4,16 +4,6 @@
   <p:sldMasterIdLst>
     <p:sldMasterId id="2147483660" r:id="rId1"/>
   </p:sldMasterIdLst>
-  <p:sldIdLst xmlns:a="http://schemas.openxmlformats.org/drawingml/2006/main" xmlns:r="http://schemas.openxmlformats.org/officeDocument/2006/relationships" xmlns:p="http://schemas.openxmlformats.org/presentationml/2006/main">
-    <p:sldId id="256" r:id="rId6"/>
-    <p:sldId id="257" r:id="rId7"/>
-    <p:sldId id="258" r:id="rId8"/>
-    <p:sldId id="259" r:id="rId9"/>
-    <p:sldId id="260" r:id="rId10"/>
-    <p:sldId id="261" r:id="rId11"/>
-    <p:sldId id="262" r:id="rId12"/>
-    <p:sldId id="263" r:id="rId13"/>
-  </p:sldIdLst>
   <p:sldSz cx="9144000" cy="6858000" type="screen4x3"/>
   <p:notesSz cx="6858000" cy="9144000"/>
   <p:defaultTextStyle>
@@ -161,7 +151,7 @@
           </a:lstStyle>
           <a:p>
             <a:r>
-              <a:rPr lang="en-US" smtClean="0"/>
+              <a:rPr lang="en-US"/>
               <a:t>Click to edit Master title style</a:t>
             </a:r>
             <a:endParaRPr lang="en-US" dirty="0"/>
@@ -226,7 +216,7 @@
           </a:lstStyle>
           <a:p>
             <a:r>
-              <a:rPr lang="en-US" smtClean="0"/>
+              <a:rPr lang="en-US"/>
               <a:t>Click to edit Master subtitle style</a:t>
             </a:r>
             <a:endParaRPr lang="en-US" dirty="0"/>
@@ -250,7 +240,7 @@
           <a:p>
             <a:fld id="{79EA90B3-B6F0-4482-B453-03FAC75A86FD}" type="datetime1">
               <a:rPr lang="en-US" smtClean="0"/>
-              <a:t>11/16/2018</a:t>
+              <a:t>11/19/18</a:t>
             </a:fld>
             <a:endParaRPr lang="en-US"/>
           </a:p>
@@ -344,7 +334,7 @@
           <a:lstStyle/>
           <a:p>
             <a:r>
-              <a:rPr lang="en-US" smtClean="0"/>
+              <a:rPr lang="en-US"/>
               <a:t>Click to edit Master title style</a:t>
             </a:r>
             <a:endParaRPr lang="en-US" dirty="0"/>
@@ -368,35 +358,35 @@
           <a:p>
             <a:pPr lvl="0"/>
             <a:r>
-              <a:rPr lang="en-US" smtClean="0"/>
+              <a:rPr lang="en-US"/>
               <a:t>Click to edit Master text styles</a:t>
             </a:r>
           </a:p>
           <a:p>
             <a:pPr lvl="1"/>
             <a:r>
-              <a:rPr lang="en-US" smtClean="0"/>
+              <a:rPr lang="en-US"/>
               <a:t>Second level</a:t>
             </a:r>
           </a:p>
           <a:p>
             <a:pPr lvl="2"/>
             <a:r>
-              <a:rPr lang="en-US" smtClean="0"/>
+              <a:rPr lang="en-US"/>
               <a:t>Third level</a:t>
             </a:r>
           </a:p>
           <a:p>
             <a:pPr lvl="3"/>
             <a:r>
-              <a:rPr lang="en-US" smtClean="0"/>
+              <a:rPr lang="en-US"/>
               <a:t>Fourth level</a:t>
             </a:r>
           </a:p>
           <a:p>
             <a:pPr lvl="4"/>
             <a:r>
-              <a:rPr lang="en-US" smtClean="0"/>
+              <a:rPr lang="en-US"/>
               <a:t>Fifth level</a:t>
             </a:r>
             <a:endParaRPr lang="en-US" dirty="0"/>
@@ -420,7 +410,7 @@
           <a:p>
             <a:fld id="{7C47CB79-EB3A-4894-A9F5-4925F8DA134F}" type="datetime1">
               <a:rPr lang="en-US" smtClean="0"/>
-              <a:t>11/16/2018</a:t>
+              <a:t>11/19/18</a:t>
             </a:fld>
             <a:endParaRPr lang="en-US"/>
           </a:p>
@@ -519,7 +509,7 @@
           <a:lstStyle/>
           <a:p>
             <a:r>
-              <a:rPr lang="en-US" smtClean="0"/>
+              <a:rPr lang="en-US"/>
               <a:t>Click to edit Master title style</a:t>
             </a:r>
             <a:endParaRPr lang="en-US" dirty="0"/>
@@ -548,35 +538,35 @@
           <a:p>
             <a:pPr lvl="0"/>
             <a:r>
-              <a:rPr lang="en-US" smtClean="0"/>
+              <a:rPr lang="en-US"/>
               <a:t>Click to edit Master text styles</a:t>
             </a:r>
           </a:p>
           <a:p>
             <a:pPr lvl="1"/>
             <a:r>
-              <a:rPr lang="en-US" smtClean="0"/>
+              <a:rPr lang="en-US"/>
               <a:t>Second level</a:t>
             </a:r>
           </a:p>
           <a:p>
             <a:pPr lvl="2"/>
             <a:r>
-              <a:rPr lang="en-US" smtClean="0"/>
+              <a:rPr lang="en-US"/>
               <a:t>Third level</a:t>
             </a:r>
           </a:p>
           <a:p>
             <a:pPr lvl="3"/>
             <a:r>
-              <a:rPr lang="en-US" smtClean="0"/>
+              <a:rPr lang="en-US"/>
               <a:t>Fourth level</a:t>
             </a:r>
           </a:p>
           <a:p>
             <a:pPr lvl="4"/>
             <a:r>
-              <a:rPr lang="en-US" smtClean="0"/>
+              <a:rPr lang="en-US"/>
               <a:t>Fifth level</a:t>
             </a:r>
             <a:endParaRPr lang="en-US" dirty="0"/>
@@ -600,7 +590,7 @@
           <a:p>
             <a:fld id="{BA2053F9-B6C4-4064-88C8-7A62AD8AB72E}" type="datetime1">
               <a:rPr lang="en-US" smtClean="0"/>
-              <a:t>11/16/2018</a:t>
+              <a:t>11/19/18</a:t>
             </a:fld>
             <a:endParaRPr lang="en-US"/>
           </a:p>
@@ -694,7 +684,7 @@
           <a:lstStyle/>
           <a:p>
             <a:r>
-              <a:rPr lang="en-US" smtClean="0"/>
+              <a:rPr lang="en-US"/>
               <a:t>Click to edit Master title style</a:t>
             </a:r>
             <a:endParaRPr lang="en-US" dirty="0"/>
@@ -718,35 +708,35 @@
           <a:p>
             <a:pPr lvl="0"/>
             <a:r>
-              <a:rPr lang="en-US" smtClean="0"/>
+              <a:rPr lang="en-US"/>
               <a:t>Click to edit Master text styles</a:t>
             </a:r>
           </a:p>
           <a:p>
             <a:pPr lvl="1"/>
             <a:r>
-              <a:rPr lang="en-US" smtClean="0"/>
+              <a:rPr lang="en-US"/>
               <a:t>Second level</a:t>
             </a:r>
           </a:p>
           <a:p>
             <a:pPr lvl="2"/>
             <a:r>
-              <a:rPr lang="en-US" smtClean="0"/>
+              <a:rPr lang="en-US"/>
               <a:t>Third level</a:t>
             </a:r>
           </a:p>
           <a:p>
             <a:pPr lvl="3"/>
             <a:r>
-              <a:rPr lang="en-US" smtClean="0"/>
+              <a:rPr lang="en-US"/>
               <a:t>Fourth level</a:t>
             </a:r>
           </a:p>
           <a:p>
             <a:pPr lvl="4"/>
             <a:r>
-              <a:rPr lang="en-US" smtClean="0"/>
+              <a:rPr lang="en-US"/>
               <a:t>Fifth level</a:t>
             </a:r>
             <a:endParaRPr lang="en-US" dirty="0"/>
@@ -770,7 +760,7 @@
           <a:p>
             <a:fld id="{A8E4AC80-47F9-44C8-BBF9-E8B42FE88819}" type="datetime1">
               <a:rPr lang="en-US" smtClean="0"/>
-              <a:t>11/16/2018</a:t>
+              <a:t>11/19/18</a:t>
             </a:fld>
             <a:endParaRPr lang="en-US"/>
           </a:p>
@@ -873,7 +863,7 @@
           </a:lstStyle>
           <a:p>
             <a:r>
-              <a:rPr lang="en-US" smtClean="0"/>
+              <a:rPr lang="en-US"/>
               <a:t>Click to edit Master title style</a:t>
             </a:r>
             <a:endParaRPr lang="en-US" dirty="0"/>
@@ -991,7 +981,7 @@
           <a:p>
             <a:pPr lvl="0"/>
             <a:r>
-              <a:rPr lang="en-US" smtClean="0"/>
+              <a:rPr lang="en-US"/>
               <a:t>Click to edit Master text styles</a:t>
             </a:r>
           </a:p>
@@ -1014,7 +1004,7 @@
           <a:p>
             <a:fld id="{2A05EF67-A129-48AB-B602-5442E86EBBE8}" type="datetime1">
               <a:rPr lang="en-US" smtClean="0"/>
-              <a:t>11/16/2018</a:t>
+              <a:t>11/19/18</a:t>
             </a:fld>
             <a:endParaRPr lang="en-US"/>
           </a:p>
@@ -1108,7 +1098,7 @@
           <a:lstStyle/>
           <a:p>
             <a:r>
-              <a:rPr lang="en-US" smtClean="0"/>
+              <a:rPr lang="en-US"/>
               <a:t>Click to edit Master title style</a:t>
             </a:r>
             <a:endParaRPr lang="en-US" dirty="0"/>
@@ -1133,42 +1123,46 @@
         </p:spPr>
         <p:txBody>
           <a:bodyPr/>
-          <a:lstStyle/>
+          <a:lstStyle>
+            <a:lvl1pPr marL="0" indent="0">
+              <a:buNone/>
+              <a:defRPr/>
+            </a:lvl1pPr>
+          </a:lstStyle>
           <a:p>
             <a:pPr lvl="0"/>
             <a:r>
-              <a:rPr lang="en-US" smtClean="0"/>
+              <a:rPr lang="en-US" dirty="0"/>
               <a:t>Click to edit Master text styles</a:t>
             </a:r>
           </a:p>
           <a:p>
             <a:pPr lvl="1"/>
             <a:r>
-              <a:rPr lang="en-US" smtClean="0"/>
+              <a:rPr lang="en-US" dirty="0"/>
               <a:t>Second level</a:t>
             </a:r>
           </a:p>
           <a:p>
             <a:pPr lvl="2"/>
             <a:r>
-              <a:rPr lang="en-US" smtClean="0"/>
+              <a:rPr lang="en-US" dirty="0"/>
               <a:t>Third level</a:t>
             </a:r>
           </a:p>
           <a:p>
             <a:pPr lvl="3"/>
             <a:r>
-              <a:rPr lang="en-US" smtClean="0"/>
+              <a:rPr lang="en-US" dirty="0"/>
               <a:t>Fourth level</a:t>
             </a:r>
           </a:p>
           <a:p>
             <a:pPr lvl="4"/>
             <a:r>
-              <a:rPr lang="en-US" smtClean="0"/>
+              <a:rPr lang="en-US" dirty="0"/>
               <a:t>Fifth level</a:t>
             </a:r>
-            <a:endParaRPr lang="en-US" dirty="0"/>
           </a:p>
         </p:txBody>
       </p:sp>
@@ -1190,42 +1184,46 @@
         </p:spPr>
         <p:txBody>
           <a:bodyPr/>
-          <a:lstStyle/>
+          <a:lstStyle>
+            <a:lvl1pPr marL="0" indent="0">
+              <a:buNone/>
+              <a:defRPr/>
+            </a:lvl1pPr>
+          </a:lstStyle>
           <a:p>
             <a:pPr lvl="0"/>
             <a:r>
-              <a:rPr lang="en-US" smtClean="0"/>
+              <a:rPr lang="en-US" dirty="0"/>
               <a:t>Click to edit Master text styles</a:t>
             </a:r>
           </a:p>
           <a:p>
             <a:pPr lvl="1"/>
             <a:r>
-              <a:rPr lang="en-US" smtClean="0"/>
+              <a:rPr lang="en-US" dirty="0"/>
               <a:t>Second level</a:t>
             </a:r>
           </a:p>
           <a:p>
             <a:pPr lvl="2"/>
             <a:r>
-              <a:rPr lang="en-US" smtClean="0"/>
+              <a:rPr lang="en-US" dirty="0"/>
               <a:t>Third level</a:t>
             </a:r>
           </a:p>
           <a:p>
             <a:pPr lvl="3"/>
             <a:r>
-              <a:rPr lang="en-US" smtClean="0"/>
+              <a:rPr lang="en-US" dirty="0"/>
               <a:t>Fourth level</a:t>
             </a:r>
           </a:p>
           <a:p>
             <a:pPr lvl="4"/>
             <a:r>
-              <a:rPr lang="en-US" smtClean="0"/>
+              <a:rPr lang="en-US" dirty="0"/>
               <a:t>Fifth level</a:t>
             </a:r>
-            <a:endParaRPr lang="en-US" dirty="0"/>
           </a:p>
         </p:txBody>
       </p:sp>
@@ -1246,7 +1244,7 @@
           <a:p>
             <a:fld id="{3C4AD0DB-6B2D-470C-B580-50F23CD7DB2B}" type="datetime1">
               <a:rPr lang="en-US" smtClean="0"/>
-              <a:t>11/16/2018</a:t>
+              <a:t>11/19/18</a:t>
             </a:fld>
             <a:endParaRPr lang="en-US"/>
           </a:p>
@@ -1345,7 +1343,7 @@
           <a:lstStyle/>
           <a:p>
             <a:r>
-              <a:rPr lang="en-US" smtClean="0"/>
+              <a:rPr lang="en-US"/>
               <a:t>Click to edit Master title style</a:t>
             </a:r>
             <a:endParaRPr lang="en-US" dirty="0"/>
@@ -1411,7 +1409,7 @@
           <a:p>
             <a:pPr lvl="0"/>
             <a:r>
-              <a:rPr lang="en-US" smtClean="0"/>
+              <a:rPr lang="en-US"/>
               <a:t>Click to edit Master text styles</a:t>
             </a:r>
           </a:p>
@@ -1439,35 +1437,35 @@
           <a:p>
             <a:pPr lvl="0"/>
             <a:r>
-              <a:rPr lang="en-US" smtClean="0"/>
+              <a:rPr lang="en-US"/>
               <a:t>Click to edit Master text styles</a:t>
             </a:r>
           </a:p>
           <a:p>
             <a:pPr lvl="1"/>
             <a:r>
-              <a:rPr lang="en-US" smtClean="0"/>
+              <a:rPr lang="en-US"/>
               <a:t>Second level</a:t>
             </a:r>
           </a:p>
           <a:p>
             <a:pPr lvl="2"/>
             <a:r>
-              <a:rPr lang="en-US" smtClean="0"/>
+              <a:rPr lang="en-US"/>
               <a:t>Third level</a:t>
             </a:r>
           </a:p>
           <a:p>
             <a:pPr lvl="3"/>
             <a:r>
-              <a:rPr lang="en-US" smtClean="0"/>
+              <a:rPr lang="en-US"/>
               <a:t>Fourth level</a:t>
             </a:r>
           </a:p>
           <a:p>
             <a:pPr lvl="4"/>
             <a:r>
-              <a:rPr lang="en-US" smtClean="0"/>
+              <a:rPr lang="en-US"/>
               <a:t>Fifth level</a:t>
             </a:r>
             <a:endParaRPr lang="en-US" dirty="0"/>
@@ -1533,7 +1531,7 @@
           <a:p>
             <a:pPr lvl="0"/>
             <a:r>
-              <a:rPr lang="en-US" smtClean="0"/>
+              <a:rPr lang="en-US"/>
               <a:t>Click to edit Master text styles</a:t>
             </a:r>
           </a:p>
@@ -1561,35 +1559,35 @@
           <a:p>
             <a:pPr lvl="0"/>
             <a:r>
-              <a:rPr lang="en-US" smtClean="0"/>
+              <a:rPr lang="en-US"/>
               <a:t>Click to edit Master text styles</a:t>
             </a:r>
           </a:p>
           <a:p>
             <a:pPr lvl="1"/>
             <a:r>
-              <a:rPr lang="en-US" smtClean="0"/>
+              <a:rPr lang="en-US"/>
               <a:t>Second level</a:t>
             </a:r>
           </a:p>
           <a:p>
             <a:pPr lvl="2"/>
             <a:r>
-              <a:rPr lang="en-US" smtClean="0"/>
+              <a:rPr lang="en-US"/>
               <a:t>Third level</a:t>
             </a:r>
           </a:p>
           <a:p>
             <a:pPr lvl="3"/>
             <a:r>
-              <a:rPr lang="en-US" smtClean="0"/>
+              <a:rPr lang="en-US"/>
               <a:t>Fourth level</a:t>
             </a:r>
           </a:p>
           <a:p>
             <a:pPr lvl="4"/>
             <a:r>
-              <a:rPr lang="en-US" smtClean="0"/>
+              <a:rPr lang="en-US"/>
               <a:t>Fifth level</a:t>
             </a:r>
             <a:endParaRPr lang="en-US" dirty="0"/>
@@ -1613,7 +1611,7 @@
           <a:p>
             <a:fld id="{DF9FF155-ADEE-4564-AB23-828C3E96A8C7}" type="datetime1">
               <a:rPr lang="en-US" smtClean="0"/>
-              <a:t>11/16/2018</a:t>
+              <a:t>11/19/18</a:t>
             </a:fld>
             <a:endParaRPr lang="en-US"/>
           </a:p>
@@ -1707,7 +1705,7 @@
           <a:lstStyle/>
           <a:p>
             <a:r>
-              <a:rPr lang="en-US" smtClean="0"/>
+              <a:rPr lang="en-US"/>
               <a:t>Click to edit Master title style</a:t>
             </a:r>
             <a:endParaRPr lang="en-US" dirty="0"/>
@@ -1731,7 +1729,7 @@
           <a:p>
             <a:fld id="{FD64555D-5829-41B5-A4A6-E52DD6B7602A}" type="datetime1">
               <a:rPr lang="en-US" smtClean="0"/>
-              <a:t>11/16/2018</a:t>
+              <a:t>11/19/18</a:t>
             </a:fld>
             <a:endParaRPr lang="en-US"/>
           </a:p>
@@ -1826,7 +1824,7 @@
           <a:p>
             <a:fld id="{2337629A-38BF-4C22-A84A-5F1BF949F3DA}" type="datetime1">
               <a:rPr lang="en-US" smtClean="0"/>
-              <a:t>11/16/2018</a:t>
+              <a:t>11/19/18</a:t>
             </a:fld>
             <a:endParaRPr lang="en-US"/>
           </a:p>
@@ -1929,7 +1927,7 @@
           </a:lstStyle>
           <a:p>
             <a:r>
-              <a:rPr lang="en-US" smtClean="0"/>
+              <a:rPr lang="en-US"/>
               <a:t>Click to edit Master title style</a:t>
             </a:r>
             <a:endParaRPr lang="en-US" dirty="0"/>
@@ -1986,35 +1984,35 @@
           <a:p>
             <a:pPr lvl="0"/>
             <a:r>
-              <a:rPr lang="en-US" smtClean="0"/>
+              <a:rPr lang="en-US"/>
               <a:t>Click to edit Master text styles</a:t>
             </a:r>
           </a:p>
           <a:p>
             <a:pPr lvl="1"/>
             <a:r>
-              <a:rPr lang="en-US" smtClean="0"/>
+              <a:rPr lang="en-US"/>
               <a:t>Second level</a:t>
             </a:r>
           </a:p>
           <a:p>
             <a:pPr lvl="2"/>
             <a:r>
-              <a:rPr lang="en-US" smtClean="0"/>
+              <a:rPr lang="en-US"/>
               <a:t>Third level</a:t>
             </a:r>
           </a:p>
           <a:p>
             <a:pPr lvl="3"/>
             <a:r>
-              <a:rPr lang="en-US" smtClean="0"/>
+              <a:rPr lang="en-US"/>
               <a:t>Fourth level</a:t>
             </a:r>
           </a:p>
           <a:p>
             <a:pPr lvl="4"/>
             <a:r>
-              <a:rPr lang="en-US" smtClean="0"/>
+              <a:rPr lang="en-US"/>
               <a:t>Fifth level</a:t>
             </a:r>
             <a:endParaRPr lang="en-US" dirty="0"/>
@@ -2080,7 +2078,7 @@
           <a:p>
             <a:pPr lvl="0"/>
             <a:r>
-              <a:rPr lang="en-US" smtClean="0"/>
+              <a:rPr lang="en-US"/>
               <a:t>Click to edit Master text styles</a:t>
             </a:r>
           </a:p>
@@ -2103,7 +2101,7 @@
           <a:p>
             <a:fld id="{0C120607-0F22-484B-8BA6-8CA8E99FF2D8}" type="datetime1">
               <a:rPr lang="en-US" smtClean="0"/>
-              <a:t>11/16/2018</a:t>
+              <a:t>11/19/18</a:t>
             </a:fld>
             <a:endParaRPr lang="en-US"/>
           </a:p>
@@ -2206,7 +2204,7 @@
           </a:lstStyle>
           <a:p>
             <a:r>
-              <a:rPr lang="en-US" smtClean="0"/>
+              <a:rPr lang="en-US"/>
               <a:t>Click to edit Master title style</a:t>
             </a:r>
             <a:endParaRPr lang="en-US" dirty="0"/>
@@ -2271,7 +2269,7 @@
           </a:lstStyle>
           <a:p>
             <a:r>
-              <a:rPr lang="en-US" smtClean="0"/>
+              <a:rPr lang="en-US"/>
               <a:t>Click icon to add picture</a:t>
             </a:r>
             <a:endParaRPr lang="en-US" dirty="0"/>
@@ -2337,7 +2335,7 @@
           <a:p>
             <a:pPr lvl="0"/>
             <a:r>
-              <a:rPr lang="en-US" smtClean="0"/>
+              <a:rPr lang="en-US"/>
               <a:t>Click to edit Master text styles</a:t>
             </a:r>
           </a:p>
@@ -2360,7 +2358,7 @@
           <a:p>
             <a:fld id="{0E07D171-8C0D-45B6-A74B-F6FB009E77AB}" type="datetime1">
               <a:rPr lang="en-US" smtClean="0"/>
-              <a:t>11/16/2018</a:t>
+              <a:t>11/19/18</a:t>
             </a:fld>
             <a:endParaRPr lang="en-US"/>
           </a:p>
@@ -2469,10 +2467,9 @@
           <a:lstStyle/>
           <a:p>
             <a:r>
-              <a:rPr lang="en-US" dirty="0" smtClean="0"/>
+              <a:rPr lang="en-US" dirty="0"/>
               <a:t>Click to edit Master title style</a:t>
             </a:r>
-            <a:endParaRPr lang="en-US" dirty="0"/>
           </a:p>
         </p:txBody>
       </p:sp>
@@ -2503,35 +2500,35 @@
           <a:p>
             <a:pPr lvl="0"/>
             <a:r>
-              <a:rPr lang="en-US" smtClean="0"/>
+              <a:rPr lang="en-US"/>
               <a:t>Click to edit Master text styles</a:t>
             </a:r>
           </a:p>
           <a:p>
             <a:pPr lvl="1"/>
             <a:r>
-              <a:rPr lang="en-US" smtClean="0"/>
+              <a:rPr lang="en-US"/>
               <a:t>Second level</a:t>
             </a:r>
           </a:p>
           <a:p>
             <a:pPr lvl="2"/>
             <a:r>
-              <a:rPr lang="en-US" smtClean="0"/>
+              <a:rPr lang="en-US"/>
               <a:t>Third level</a:t>
             </a:r>
           </a:p>
           <a:p>
             <a:pPr lvl="3"/>
             <a:r>
-              <a:rPr lang="en-US" smtClean="0"/>
+              <a:rPr lang="en-US"/>
               <a:t>Fourth level</a:t>
             </a:r>
           </a:p>
           <a:p>
             <a:pPr lvl="4"/>
             <a:r>
-              <a:rPr lang="en-US" smtClean="0"/>
+              <a:rPr lang="en-US"/>
               <a:t>Fifth level</a:t>
             </a:r>
             <a:endParaRPr lang="en-US" dirty="0"/>
@@ -2576,7 +2573,7 @@
             <a:fld id="{3DE9048E-B424-4182-885C-08F32BE574F0}" type="datetime1">
               <a:rPr lang="en-US" smtClean="0"/>
               <a:pPr/>
-              <a:t>11/16/2018</a:t>
+              <a:t>11/19/18</a:t>
             </a:fld>
             <a:endParaRPr lang="en-US"/>
           </a:p>
@@ -2970,1449 +2967,6 @@
 </p:sldMaster>
 </file>
 
-<file path=ppt/slides/slide1.xml><?xml version="1.0" encoding="utf-8"?>
-<p:sld xmlns:a="http://schemas.openxmlformats.org/drawingml/2006/main" xmlns:r="http://schemas.openxmlformats.org/officeDocument/2006/relationships" xmlns:p="http://schemas.openxmlformats.org/presentationml/2006/main">
-  <p:cSld>
-    <p:spTree>
-      <p:nvGrpSpPr>
-        <p:cNvPr id="1" name=""/>
-        <p:cNvGrpSpPr/>
-        <p:nvPr/>
-      </p:nvGrpSpPr>
-      <p:grpSpPr>
-        <a:xfrm>
-          <a:off x="0" y="0"/>
-          <a:ext cx="0" cy="0"/>
-          <a:chOff x="0" y="0"/>
-          <a:chExt cx="0" cy="0"/>
-        </a:xfrm>
-      </p:grpSpPr>
-      <p:sp xmlns:a="http://schemas.openxmlformats.org/drawingml/2006/main" xmlns:r="http://schemas.openxmlformats.org/officeDocument/2006/relationships" xmlns:p="http://schemas.openxmlformats.org/presentationml/2006/main">
-        <p:nvSpPr>
-          <p:cNvPr id="2" name=""/>
-          <p:cNvSpPr>
-            <a:spLocks noGrp="1"/>
-          </p:cNvSpPr>
-          <p:nvPr>
-            <p:ph type="ctrTitle"/>
-          </p:nvPr>
-        </p:nvSpPr>
-        <p:spPr>
-          <a:xfrm>
-            <a:off x="685800" y="1122363"/>
-            <a:ext cx="7772400" cy="2387600"/>
-          </a:xfrm>
-        </p:spPr>
-        <p:txBody>
-          <a:bodyPr/>
-          <a:lstStyle/>
-          <a:p>
-            <a:r>
-              <a:rPr/>
-              <a:t>Advantages of a Bear Market</a:t>
-            </a:r>
-          </a:p>
-        </p:txBody>
-      </p:sp>
-      <p:sp xmlns:a="http://schemas.openxmlformats.org/drawingml/2006/main" xmlns:r="http://schemas.openxmlformats.org/officeDocument/2006/relationships" xmlns:p="http://schemas.openxmlformats.org/presentationml/2006/main">
-        <p:nvSpPr>
-          <p:cNvPr id="3" name=""/>
-          <p:cNvSpPr>
-            <a:spLocks noGrp="1"/>
-          </p:cNvSpPr>
-          <p:nvPr>
-            <p:ph type="subTitle" idx="1"/>
-          </p:nvPr>
-        </p:nvSpPr>
-        <p:spPr>
-          <a:xfrm>
-            <a:off x="1143000" y="3602038"/>
-            <a:ext cx="6858000" cy="1655762"/>
-          </a:xfrm>
-        </p:spPr>
-        <p:txBody>
-          <a:bodyPr/>
-          <a:lstStyle/>
-          <a:p>
-            <a:r>
-              <a:rPr/>
-              <a:t>Yes there is a Positive Side to a Bear Market!</a:t>
-            </a:r>
-          </a:p>
-        </p:txBody>
-      </p:sp>
-      <p:sp xmlns:a="http://schemas.openxmlformats.org/drawingml/2006/main" xmlns:r="http://schemas.openxmlformats.org/officeDocument/2006/relationships" xmlns:p="http://schemas.openxmlformats.org/presentationml/2006/main">
-        <p:nvSpPr>
-          <p:cNvPr id="4" name=""/>
-          <p:cNvSpPr>
-            <a:spLocks noGrp="1"/>
-          </p:cNvSpPr>
-          <p:nvPr>
-            <p:ph type="sldNum" sz="quarter" idx="12"/>
-          </p:nvPr>
-        </p:nvSpPr>
-        <p:spPr>
-          <a:xfrm>
-            <a:off x="6457950" y="6356351"/>
-            <a:ext cx="2057400" cy="365125"/>
-          </a:xfrm>
-        </p:spPr>
-        <p:txBody>
-          <a:bodyPr/>
-          <a:lstStyle/>
-          <a:p>
-            <a:r>
-              <a:rPr/>
-              <a:t>1</a:t>
-            </a:r>
-          </a:p>
-        </p:txBody>
-      </p:sp>
-    </p:spTree>
-  </p:cSld>
-  <p:clrMapOvr>
-    <a:masterClrMapping/>
-  </p:clrMapOvr>
-</p:sld>
-</file>
-
-<file path=ppt/slides/slide2.xml><?xml version="1.0" encoding="utf-8"?>
-<p:sld xmlns:a="http://schemas.openxmlformats.org/drawingml/2006/main" xmlns:r="http://schemas.openxmlformats.org/officeDocument/2006/relationships" xmlns:p="http://schemas.openxmlformats.org/presentationml/2006/main">
-  <p:cSld>
-    <p:spTree>
-      <p:nvGrpSpPr>
-        <p:cNvPr id="1" name=""/>
-        <p:cNvGrpSpPr/>
-        <p:nvPr/>
-      </p:nvGrpSpPr>
-      <p:grpSpPr>
-        <a:xfrm>
-          <a:off x="0" y="0"/>
-          <a:ext cx="0" cy="0"/>
-          <a:chOff x="0" y="0"/>
-          <a:chExt cx="0" cy="0"/>
-        </a:xfrm>
-      </p:grpSpPr>
-      <p:sp xmlns:a="http://schemas.openxmlformats.org/drawingml/2006/main" xmlns:r="http://schemas.openxmlformats.org/officeDocument/2006/relationships" xmlns:p="http://schemas.openxmlformats.org/presentationml/2006/main">
-        <p:nvSpPr>
-          <p:cNvPr id="2" name=""/>
-          <p:cNvSpPr>
-            <a:spLocks noGrp="1"/>
-          </p:cNvSpPr>
-          <p:nvPr>
-            <p:ph type="title"/>
-          </p:nvPr>
-        </p:nvSpPr>
-        <p:spPr>
-          <a:xfrm>
-            <a:off x="628650" y="365126"/>
-            <a:ext cx="7886700" cy="1325563"/>
-          </a:xfrm>
-        </p:spPr>
-        <p:txBody>
-          <a:bodyPr/>
-          <a:lstStyle/>
-          <a:p>
-            <a:r>
-              <a:rPr/>
-              <a:t>Investing in Stocks</a:t>
-            </a:r>
-          </a:p>
-        </p:txBody>
-      </p:sp>
-      <p:sp xmlns:a="http://schemas.openxmlformats.org/drawingml/2006/main" xmlns:r="http://schemas.openxmlformats.org/officeDocument/2006/relationships" xmlns:p="http://schemas.openxmlformats.org/presentationml/2006/main">
-        <p:nvSpPr>
-          <p:cNvPr id="3" name=""/>
-          <p:cNvSpPr>
-            <a:spLocks noGrp="1"/>
-          </p:cNvSpPr>
-          <p:nvPr>
-            <p:ph sz="half" idx="1"/>
-          </p:nvPr>
-        </p:nvSpPr>
-        <p:spPr>
-          <a:xfrm>
-            <a:off x="628650" y="1825625"/>
-            <a:ext cx="3886200" cy="4351338"/>
-          </a:xfrm>
-        </p:spPr>
-        <p:txBody>
-          <a:bodyPr/>
-          <a:lstStyle/>
-          <a:p>
-            <a:pPr/>
-            <a:r>
-              <a:rPr/>
-              <a:t>1. Represents ownership in a firm</a:t>
-            </a:r>
-          </a:p>
-          <a:p>
-            <a:pPr/>
-            <a:r>
-              <a:rPr/>
-              <a:t>2. Earn a return in two ways</a:t>
-            </a:r>
-          </a:p>
-          <a:p>
-            <a:pPr lvl="1"/>
-            <a:r>
-              <a:rPr/>
-              <a:t>Price of the stock rises</a:t>
-            </a:r>
-          </a:p>
-          <a:p>
-            <a:pPr lvl="1"/>
-            <a:r>
-              <a:rPr/>
-              <a:t>Dividends are paid to the stock holder</a:t>
-            </a:r>
-          </a:p>
-          <a:p>
-            <a:pPr/>
-            <a:r>
-              <a:rPr/>
-              <a:t>3. Stockholders have claim on all assets</a:t>
-            </a:r>
-          </a:p>
-        </p:txBody>
-      </p:sp>
-      <p:sp xmlns:a="http://schemas.openxmlformats.org/drawingml/2006/main" xmlns:r="http://schemas.openxmlformats.org/officeDocument/2006/relationships" xmlns:p="http://schemas.openxmlformats.org/presentationml/2006/main">
-        <p:nvSpPr>
-          <p:cNvPr id="4" name=""/>
-          <p:cNvSpPr>
-            <a:spLocks noGrp="1"/>
-          </p:cNvSpPr>
-          <p:nvPr>
-            <p:ph sz="half" idx="2"/>
-          </p:nvPr>
-        </p:nvSpPr>
-        <p:spPr>
-          <a:xfrm>
-            <a:off x="4629150" y="1825625"/>
-            <a:ext cx="3886200" cy="4351338"/>
-          </a:xfrm>
-        </p:spPr>
-        <p:txBody>
-          <a:bodyPr/>
-          <a:lstStyle/>
-          <a:p>
-            <a:pPr/>
-            <a:r>
-              <a:rPr/>
-              <a:t>4. Right to vote for directors and on certain issues</a:t>
-            </a:r>
-          </a:p>
-          <a:p>
-            <a:pPr/>
-            <a:r>
-              <a:rPr/>
-              <a:t>5. Two types</a:t>
-            </a:r>
-          </a:p>
-          <a:p>
-            <a:pPr lvl="1"/>
-            <a:r>
-              <a:rPr/>
-              <a:t>Common stock</a:t>
-            </a:r>
-          </a:p>
-          <a:p>
-            <a:pPr lvl="2"/>
-            <a:r>
-              <a:rPr/>
-              <a:t>Right to vote</a:t>
-            </a:r>
-          </a:p>
-          <a:p>
-            <a:pPr lvl="2"/>
-            <a:r>
-              <a:rPr/>
-              <a:t>Receive dividends</a:t>
-            </a:r>
-          </a:p>
-          <a:p>
-            <a:pPr lvl="1"/>
-            <a:r>
-              <a:rPr/>
-              <a:t>Preferred stock</a:t>
-            </a:r>
-          </a:p>
-          <a:p>
-            <a:pPr lvl="2"/>
-            <a:r>
-              <a:rPr/>
-              <a:t>Receive a fixed devidend</a:t>
-            </a:r>
-          </a:p>
-          <a:p>
-            <a:pPr lvl="2"/>
-            <a:r>
-              <a:rPr/>
-              <a:t>Do not usually vote</a:t>
-            </a:r>
-          </a:p>
-        </p:txBody>
-      </p:sp>
-      <p:sp xmlns:a="http://schemas.openxmlformats.org/drawingml/2006/main" xmlns:r="http://schemas.openxmlformats.org/officeDocument/2006/relationships" xmlns:p="http://schemas.openxmlformats.org/presentationml/2006/main">
-        <p:nvSpPr>
-          <p:cNvPr id="5" name=""/>
-          <p:cNvSpPr>
-            <a:spLocks noGrp="1"/>
-          </p:cNvSpPr>
-          <p:nvPr>
-            <p:ph type="sldNum" sz="quarter" idx="12"/>
-          </p:nvPr>
-        </p:nvSpPr>
-        <p:spPr>
-          <a:xfrm>
-            <a:off x="6457950" y="6356351"/>
-            <a:ext cx="2057400" cy="365125"/>
-          </a:xfrm>
-        </p:spPr>
-        <p:txBody>
-          <a:bodyPr/>
-          <a:lstStyle/>
-          <a:p>
-            <a:r>
-              <a:rPr/>
-              <a:t>2</a:t>
-            </a:r>
-          </a:p>
-        </p:txBody>
-      </p:sp>
-      <p:sp xmlns:a="http://schemas.openxmlformats.org/drawingml/2006/main" xmlns:r="http://schemas.openxmlformats.org/officeDocument/2006/relationships" xmlns:p="http://schemas.openxmlformats.org/presentationml/2006/main">
-        <p:nvSpPr>
-          <p:cNvPr id="6" name=""/>
-          <p:cNvSpPr>
-            <a:spLocks noGrp="1"/>
-          </p:cNvSpPr>
-          <p:nvPr>
-            <p:ph type="ftr" sz="quarter" idx="11"/>
-          </p:nvPr>
-        </p:nvSpPr>
-        <p:spPr>
-          <a:xfrm>
-            <a:off x="3028950" y="6356351"/>
-            <a:ext cx="3086100" cy="365125"/>
-          </a:xfrm>
-        </p:spPr>
-        <p:txBody>
-          <a:bodyPr/>
-          <a:lstStyle/>
-          <a:p>
-            <a:r>
-              <a:rPr/>
-              <a:t>Copyright © 2006 Pearson Addison-Wesley. All rights</a:t>
-            </a:r>
-          </a:p>
-        </p:txBody>
-      </p:sp>
-    </p:spTree>
-  </p:cSld>
-  <p:clrMapOvr>
-    <a:masterClrMapping/>
-  </p:clrMapOvr>
-</p:sld>
-</file>
-
-<file path=ppt/slides/slide3.xml><?xml version="1.0" encoding="utf-8"?>
-<p:sld xmlns:a="http://schemas.openxmlformats.org/drawingml/2006/main" xmlns:r="http://schemas.openxmlformats.org/officeDocument/2006/relationships" xmlns:p="http://schemas.openxmlformats.org/presentationml/2006/main">
-  <p:cSld>
-    <p:spTree>
-      <p:nvGrpSpPr>
-        <p:cNvPr id="1" name=""/>
-        <p:cNvGrpSpPr/>
-        <p:nvPr/>
-      </p:nvGrpSpPr>
-      <p:grpSpPr>
-        <a:xfrm>
-          <a:off x="0" y="0"/>
-          <a:ext cx="0" cy="0"/>
-          <a:chOff x="0" y="0"/>
-          <a:chExt cx="0" cy="0"/>
-        </a:xfrm>
-      </p:grpSpPr>
-      <p:sp xmlns:a="http://schemas.openxmlformats.org/drawingml/2006/main" xmlns:r="http://schemas.openxmlformats.org/officeDocument/2006/relationships" xmlns:p="http://schemas.openxmlformats.org/presentationml/2006/main">
-        <p:nvSpPr>
-          <p:cNvPr id="2" name=""/>
-          <p:cNvSpPr>
-            <a:spLocks noGrp="1"/>
-          </p:cNvSpPr>
-          <p:nvPr>
-            <p:ph type="title"/>
-          </p:nvPr>
-        </p:nvSpPr>
-        <p:spPr>
-          <a:xfrm>
-            <a:off x="628650" y="365126"/>
-            <a:ext cx="7886700" cy="1325563"/>
-          </a:xfrm>
-        </p:spPr>
-        <p:txBody>
-          <a:bodyPr/>
-          <a:lstStyle/>
-          <a:p>
-            <a:r>
-              <a:rPr/>
-              <a:t>Investing in Stocks: Sample Corporate Stock Certificate</a:t>
-            </a:r>
-          </a:p>
-        </p:txBody>
-      </p:sp>
-      <p:pic xmlns:a="http://schemas.openxmlformats.org/drawingml/2006/main" xmlns:r="http://schemas.openxmlformats.org/officeDocument/2006/relationships" xmlns:p="http://schemas.openxmlformats.org/presentationml/2006/main">
-        <p:nvPicPr>
-          <p:cNvPr id="3" name="pic"/>
-          <p:cNvPicPr/>
-          <p:nvPr/>
-        </p:nvPicPr>
-        <p:blipFill>
-          <a:blip cstate="print" r:embed="rId2"/>
-          <a:stretch>
-            <a:fillRect/>
-          </a:stretch>
-        </p:blipFill>
-        <p:spPr>
-          <a:xfrm>
-            <a:off x="628650" y="1825625"/>
-            <a:ext cx="7886700" cy="4351338"/>
-          </a:xfrm>
-          <a:prstGeom prst="rect">
-            <a:avLst/>
-          </a:prstGeom>
-        </p:spPr>
-      </p:pic>
-      <p:sp xmlns:a="http://schemas.openxmlformats.org/drawingml/2006/main" xmlns:r="http://schemas.openxmlformats.org/officeDocument/2006/relationships" xmlns:p="http://schemas.openxmlformats.org/presentationml/2006/main">
-        <p:nvSpPr>
-          <p:cNvPr id="4" name=""/>
-          <p:cNvSpPr>
-            <a:spLocks noGrp="1"/>
-          </p:cNvSpPr>
-          <p:nvPr>
-            <p:ph type="ftr" sz="quarter" idx="11"/>
-          </p:nvPr>
-        </p:nvSpPr>
-        <p:spPr>
-          <a:xfrm>
-            <a:off x="3028950" y="6356351"/>
-            <a:ext cx="3086100" cy="365125"/>
-          </a:xfrm>
-        </p:spPr>
-        <p:txBody>
-          <a:bodyPr/>
-          <a:lstStyle/>
-          <a:p>
-            <a:r>
-              <a:rPr/>
-              <a:t>Figure 11.1. Wien Consolidated Airlines Stock</a:t>
-            </a:r>
-          </a:p>
-        </p:txBody>
-      </p:sp>
-      <p:sp xmlns:a="http://schemas.openxmlformats.org/drawingml/2006/main" xmlns:r="http://schemas.openxmlformats.org/officeDocument/2006/relationships" xmlns:p="http://schemas.openxmlformats.org/presentationml/2006/main">
-        <p:nvSpPr>
-          <p:cNvPr id="5" name=""/>
-          <p:cNvSpPr>
-            <a:spLocks noGrp="1"/>
-          </p:cNvSpPr>
-          <p:nvPr>
-            <p:ph type="sldNum" sz="quarter" idx="12"/>
-          </p:nvPr>
-        </p:nvSpPr>
-        <p:spPr>
-          <a:xfrm>
-            <a:off x="6457950" y="6356351"/>
-            <a:ext cx="2057400" cy="365125"/>
-          </a:xfrm>
-        </p:spPr>
-        <p:txBody>
-          <a:bodyPr/>
-          <a:lstStyle/>
-          <a:p>
-            <a:r>
-              <a:rPr/>
-              <a:t>3</a:t>
-            </a:r>
-          </a:p>
-        </p:txBody>
-      </p:sp>
-    </p:spTree>
-  </p:cSld>
-  <p:clrMapOvr>
-    <a:masterClrMapping/>
-  </p:clrMapOvr>
-</p:sld>
-</file>
-
-<file path=ppt/slides/slide4.xml><?xml version="1.0" encoding="utf-8"?>
-<p:sld xmlns:a="http://schemas.openxmlformats.org/drawingml/2006/main" xmlns:r="http://schemas.openxmlformats.org/officeDocument/2006/relationships" xmlns:p="http://schemas.openxmlformats.org/presentationml/2006/main">
-  <p:cSld>
-    <p:spTree>
-      <p:nvGrpSpPr>
-        <p:cNvPr id="1" name=""/>
-        <p:cNvGrpSpPr/>
-        <p:nvPr/>
-      </p:nvGrpSpPr>
-      <p:grpSpPr>
-        <a:xfrm>
-          <a:off x="0" y="0"/>
-          <a:ext cx="0" cy="0"/>
-          <a:chOff x="0" y="0"/>
-          <a:chExt cx="0" cy="0"/>
-        </a:xfrm>
-      </p:grpSpPr>
-      <p:sp xmlns:a="http://schemas.openxmlformats.org/drawingml/2006/main" xmlns:r="http://schemas.openxmlformats.org/officeDocument/2006/relationships" xmlns:p="http://schemas.openxmlformats.org/presentationml/2006/main">
-        <p:nvSpPr>
-          <p:cNvPr id="2" name=""/>
-          <p:cNvSpPr>
-            <a:spLocks noGrp="1"/>
-          </p:cNvSpPr>
-          <p:nvPr>
-            <p:ph type="title"/>
-          </p:nvPr>
-        </p:nvSpPr>
-        <p:spPr>
-          <a:xfrm>
-            <a:off x="628650" y="365126"/>
-            <a:ext cx="7886700" cy="1325563"/>
-          </a:xfrm>
-        </p:spPr>
-        <p:txBody>
-          <a:bodyPr/>
-          <a:lstStyle/>
-          <a:p>
-            <a:r>
-              <a:rPr/>
-              <a:t>What is a Bear Market?</a:t>
-            </a:r>
-          </a:p>
-        </p:txBody>
-      </p:sp>
-      <p:sp xmlns:a="http://schemas.openxmlformats.org/drawingml/2006/main" xmlns:r="http://schemas.openxmlformats.org/officeDocument/2006/relationships" xmlns:p="http://schemas.openxmlformats.org/presentationml/2006/main">
-        <p:nvSpPr>
-          <p:cNvPr id="3" name=""/>
-          <p:cNvSpPr>
-            <a:spLocks noGrp="1"/>
-          </p:cNvSpPr>
-          <p:nvPr>
-            <p:ph idx="1"/>
-          </p:nvPr>
-        </p:nvSpPr>
-        <p:spPr>
-          <a:xfrm>
-            <a:off x="628650" y="1825625"/>
-            <a:ext cx="7886700" cy="4351338"/>
-          </a:xfrm>
-        </p:spPr>
-        <p:txBody>
-          <a:bodyPr/>
-          <a:lstStyle/>
-          <a:p>
-            <a:r>
-              <a:rPr/>
-              <a:t>A decline of 15-20% of the broad market coupled with pessimistic sentiment underlying the stock market.</a:t>
-            </a:r>
-          </a:p>
-        </p:txBody>
-      </p:sp>
-      <p:pic xmlns:a="http://schemas.openxmlformats.org/drawingml/2006/main" xmlns:r="http://schemas.openxmlformats.org/officeDocument/2006/relationships" xmlns:p="http://schemas.openxmlformats.org/presentationml/2006/main">
-        <p:nvPicPr>
-          <p:cNvPr id="4" name="pic"/>
-          <p:cNvPicPr/>
-          <p:nvPr/>
-        </p:nvPicPr>
-        <p:blipFill>
-          <a:blip cstate="print" r:embed="rId2"/>
-          <a:stretch>
-            <a:fillRect/>
-          </a:stretch>
-        </p:blipFill>
-        <p:spPr>
-          <a:xfrm>
-            <a:off x="3657600" y="3657600"/>
-            <a:ext cx="4572000" cy="2743200"/>
-          </a:xfrm>
-          <a:prstGeom prst="rect">
-            <a:avLst/>
-          </a:prstGeom>
-        </p:spPr>
-      </p:pic>
-      <p:sp xmlns:a="http://schemas.openxmlformats.org/drawingml/2006/main" xmlns:r="http://schemas.openxmlformats.org/officeDocument/2006/relationships" xmlns:p="http://schemas.openxmlformats.org/presentationml/2006/main">
-        <p:nvSpPr>
-          <p:cNvPr id="5" name=""/>
-          <p:cNvSpPr>
-            <a:spLocks noGrp="1"/>
-          </p:cNvSpPr>
-          <p:nvPr>
-            <p:ph type="sldNum" sz="quarter" idx="12"/>
-          </p:nvPr>
-        </p:nvSpPr>
-        <p:spPr>
-          <a:xfrm>
-            <a:off x="6457950" y="6356351"/>
-            <a:ext cx="2057400" cy="365125"/>
-          </a:xfrm>
-        </p:spPr>
-        <p:txBody>
-          <a:bodyPr/>
-          <a:lstStyle/>
-          <a:p>
-            <a:r>
-              <a:rPr/>
-              <a:t>4</a:t>
-            </a:r>
-          </a:p>
-        </p:txBody>
-      </p:sp>
-    </p:spTree>
-  </p:cSld>
-  <p:clrMapOvr>
-    <a:masterClrMapping/>
-  </p:clrMapOvr>
-</p:sld>
-</file>
-
-<file path=ppt/slides/slide5.xml><?xml version="1.0" encoding="utf-8"?>
-<p:sld xmlns:a="http://schemas.openxmlformats.org/drawingml/2006/main" xmlns:r="http://schemas.openxmlformats.org/officeDocument/2006/relationships" xmlns:p="http://schemas.openxmlformats.org/presentationml/2006/main">
-  <p:cSld>
-    <p:spTree>
-      <p:nvGrpSpPr>
-        <p:cNvPr id="1" name=""/>
-        <p:cNvGrpSpPr/>
-        <p:nvPr/>
-      </p:nvGrpSpPr>
-      <p:grpSpPr>
-        <a:xfrm>
-          <a:off x="0" y="0"/>
-          <a:ext cx="0" cy="0"/>
-          <a:chOff x="0" y="0"/>
-          <a:chExt cx="0" cy="0"/>
-        </a:xfrm>
-      </p:grpSpPr>
-      <p:sp xmlns:a="http://schemas.openxmlformats.org/drawingml/2006/main" xmlns:r="http://schemas.openxmlformats.org/officeDocument/2006/relationships" xmlns:p="http://schemas.openxmlformats.org/presentationml/2006/main">
-        <p:nvSpPr>
-          <p:cNvPr id="2" name=""/>
-          <p:cNvSpPr>
-            <a:spLocks noGrp="1"/>
-          </p:cNvSpPr>
-          <p:nvPr>
-            <p:ph type="title"/>
-          </p:nvPr>
-        </p:nvSpPr>
-        <p:spPr>
-          <a:xfrm>
-            <a:off x="628650" y="365126"/>
-            <a:ext cx="7886700" cy="1325563"/>
-          </a:xfrm>
-        </p:spPr>
-        <p:txBody>
-          <a:bodyPr/>
-          <a:lstStyle/>
-          <a:p>
-            <a:r>
-              <a:rPr/>
-              <a:t>Stock Market Indexes: the Dow Jones Industrial Average</a:t>
-            </a:r>
-          </a:p>
-        </p:txBody>
-      </p:sp>
-      <p:graphicFrame xmlns:a="http://schemas.openxmlformats.org/drawingml/2006/main" xmlns:r="http://schemas.openxmlformats.org/officeDocument/2006/relationships" xmlns:p="http://schemas.openxmlformats.org/presentationml/2006/main">
-        <p:nvGraphicFramePr>
-          <p:cNvPr id="3" name=""/>
-          <p:cNvGraphicFramePr>
-            <a:graphicFrameLocks noGrp="true"/>
-          </p:cNvGraphicFramePr>
-          <p:nvPr/>
-        </p:nvGraphicFramePr>
-        <p:xfrm rot="0">
-          <a:off x="628650" y="1825625"/>
-          <a:ext cx="7886700" cy="4351338"/>
-        </p:xfrm>
-        <a:graphic>
-          <a:graphicData uri="http://schemas.openxmlformats.org/drawingml/2006/table">
-            <a:tbl>
-              <a:tblPr firstRow="1">
-                <a:tableStyleId>{5C22544A-7EE6-4342-B048-85BDC9FD1C3A}</a:tableStyleId>
-              </a:tblPr>
-              <a:tblGrid>
-                <a:gridCol w="2628900"/>
-                <a:gridCol w="2628900"/>
-                <a:gridCol w="2628900"/>
-              </a:tblGrid>
-              <a:tr h="395576">
-                <a:tc>
-                  <a:txBody>
-                    <a:bodyPr/>
-                    <a:lstStyle/>
-                    <a:p>
-                      <a:r>
-                        <a:t>Companies of</a:t>
-                      </a:r>
-                    </a:p>
-                  </a:txBody>
-                </a:tc>
-                <a:tc>
-                  <a:txBody>
-                    <a:bodyPr/>
-                    <a:lstStyle/>
-                    <a:p>
-                      <a:r>
-                        <a:t>the Dow Jones</a:t>
-                      </a:r>
-                    </a:p>
-                  </a:txBody>
-                </a:tc>
-                <a:tc>
-                  <a:txBody>
-                    <a:bodyPr/>
-                    <a:lstStyle/>
-                    <a:p>
-                      <a:r>
-                        <a:t>Industrial Average</a:t>
-                      </a:r>
-                    </a:p>
-                  </a:txBody>
-                </a:tc>
-              </a:tr>
-              <a:tr h="395576">
-                <a:tc>
-                  <a:txBody>
-                    <a:bodyPr/>
-                    <a:lstStyle/>
-                    <a:p>
-                      <a:r>
-                        <a:t>3M</a:t>
-                      </a:r>
-                    </a:p>
-                  </a:txBody>
-                </a:tc>
-                <a:tc>
-                  <a:txBody>
-                    <a:bodyPr/>
-                    <a:lstStyle/>
-                    <a:p>
-                      <a:r>
-                        <a:t>American Express</a:t>
-                      </a:r>
-                    </a:p>
-                  </a:txBody>
-                </a:tc>
-                <a:tc>
-                  <a:txBody>
-                    <a:bodyPr/>
-                    <a:lstStyle/>
-                    <a:p>
-                      <a:r>
-                        <a:t>Apple</a:t>
-                      </a:r>
-                    </a:p>
-                  </a:txBody>
-                </a:tc>
-              </a:tr>
-              <a:tr h="395576">
-                <a:tc>
-                  <a:txBody>
-                    <a:bodyPr/>
-                    <a:lstStyle/>
-                    <a:p>
-                      <a:r>
-                        <a:t>Boeing</a:t>
-                      </a:r>
-                    </a:p>
-                  </a:txBody>
-                </a:tc>
-                <a:tc>
-                  <a:txBody>
-                    <a:bodyPr/>
-                    <a:lstStyle/>
-                    <a:p>
-                      <a:r>
-                        <a:t>Caterpillar</a:t>
-                      </a:r>
-                    </a:p>
-                  </a:txBody>
-                </a:tc>
-                <a:tc>
-                  <a:txBody>
-                    <a:bodyPr/>
-                    <a:lstStyle/>
-                    <a:p>
-                      <a:r>
-                        <a:t>Chevron</a:t>
-                      </a:r>
-                    </a:p>
-                  </a:txBody>
-                </a:tc>
-              </a:tr>
-              <a:tr h="395576">
-                <a:tc>
-                  <a:txBody>
-                    <a:bodyPr/>
-                    <a:lstStyle/>
-                    <a:p>
-                      <a:r>
-                        <a:t>Cisco</a:t>
-                      </a:r>
-                    </a:p>
-                  </a:txBody>
-                </a:tc>
-                <a:tc>
-                  <a:txBody>
-                    <a:bodyPr/>
-                    <a:lstStyle/>
-                    <a:p>
-                      <a:r>
-                        <a:t>Coca-Cola</a:t>
-                      </a:r>
-                    </a:p>
-                  </a:txBody>
-                </a:tc>
-                <a:tc>
-                  <a:txBody>
-                    <a:bodyPr/>
-                    <a:lstStyle/>
-                    <a:p>
-                      <a:r>
-                        <a:t>Disney</a:t>
-                      </a:r>
-                    </a:p>
-                  </a:txBody>
-                </a:tc>
-              </a:tr>
-              <a:tr h="395576">
-                <a:tc>
-                  <a:txBody>
-                    <a:bodyPr/>
-                    <a:lstStyle/>
-                    <a:p>
-                      <a:r>
-                        <a:t>DowDuPont Inc</a:t>
-                      </a:r>
-                    </a:p>
-                  </a:txBody>
-                </a:tc>
-                <a:tc>
-                  <a:txBody>
-                    <a:bodyPr/>
-                    <a:lstStyle/>
-                    <a:p>
-                      <a:r>
-                        <a:t>Exxon Mobil</a:t>
-                      </a:r>
-                    </a:p>
-                  </a:txBody>
-                </a:tc>
-                <a:tc>
-                  <a:txBody>
-                    <a:bodyPr/>
-                    <a:lstStyle/>
-                    <a:p>
-                      <a:r>
-                        <a:t>Goldman Sachs</a:t>
-                      </a:r>
-                    </a:p>
-                  </a:txBody>
-                </a:tc>
-              </a:tr>
-              <a:tr h="395576">
-                <a:tc>
-                  <a:txBody>
-                    <a:bodyPr/>
-                    <a:lstStyle/>
-                    <a:p>
-                      <a:r>
-                        <a:t>Home Depot</a:t>
-                      </a:r>
-                    </a:p>
-                  </a:txBody>
-                </a:tc>
-                <a:tc>
-                  <a:txBody>
-                    <a:bodyPr/>
-                    <a:lstStyle/>
-                    <a:p>
-                      <a:r>
-                        <a:t>IBM</a:t>
-                      </a:r>
-                    </a:p>
-                  </a:txBody>
-                </a:tc>
-                <a:tc>
-                  <a:txBody>
-                    <a:bodyPr/>
-                    <a:lstStyle/>
-                    <a:p>
-                      <a:r>
-                        <a:t>Intel</a:t>
-                      </a:r>
-                    </a:p>
-                  </a:txBody>
-                </a:tc>
-              </a:tr>
-              <a:tr h="395576">
-                <a:tc>
-                  <a:txBody>
-                    <a:bodyPr/>
-                    <a:lstStyle/>
-                    <a:p>
-                      <a:r>
-                        <a:t>Johnson &amp; Johnson</a:t>
-                      </a:r>
-                    </a:p>
-                  </a:txBody>
-                </a:tc>
-                <a:tc>
-                  <a:txBody>
-                    <a:bodyPr/>
-                    <a:lstStyle/>
-                    <a:p>
-                      <a:r>
-                        <a:t>JPMorgan Chase</a:t>
-                      </a:r>
-                    </a:p>
-                  </a:txBody>
-                </a:tc>
-                <a:tc>
-                  <a:txBody>
-                    <a:bodyPr/>
-                    <a:lstStyle/>
-                    <a:p>
-                      <a:r>
-                        <a:t>McDonald's</a:t>
-                      </a:r>
-                    </a:p>
-                  </a:txBody>
-                </a:tc>
-              </a:tr>
-              <a:tr h="395576">
-                <a:tc>
-                  <a:txBody>
-                    <a:bodyPr/>
-                    <a:lstStyle/>
-                    <a:p>
-                      <a:r>
-                        <a:t>Merck</a:t>
-                      </a:r>
-                    </a:p>
-                  </a:txBody>
-                </a:tc>
-                <a:tc>
-                  <a:txBody>
-                    <a:bodyPr/>
-                    <a:lstStyle/>
-                    <a:p>
-                      <a:r>
-                        <a:t>Microsoft</a:t>
-                      </a:r>
-                    </a:p>
-                  </a:txBody>
-                </a:tc>
-                <a:tc>
-                  <a:txBody>
-                    <a:bodyPr/>
-                    <a:lstStyle/>
-                    <a:p>
-                      <a:r>
-                        <a:t>Nike</a:t>
-                      </a:r>
-                    </a:p>
-                  </a:txBody>
-                </a:tc>
-              </a:tr>
-              <a:tr h="395576">
-                <a:tc>
-                  <a:txBody>
-                    <a:bodyPr/>
-                    <a:lstStyle/>
-                    <a:p>
-                      <a:r>
-                        <a:t>Pfizer</a:t>
-                      </a:r>
-                    </a:p>
-                  </a:txBody>
-                </a:tc>
-                <a:tc>
-                  <a:txBody>
-                    <a:bodyPr/>
-                    <a:lstStyle/>
-                    <a:p>
-                      <a:r>
-                        <a:t>Procter &amp; Gamble</a:t>
-                      </a:r>
-                    </a:p>
-                  </a:txBody>
-                </a:tc>
-                <a:tc>
-                  <a:txBody>
-                    <a:bodyPr/>
-                    <a:lstStyle/>
-                    <a:p>
-                      <a:r>
-                        <a:t>Travelers Companies Inc</a:t>
-                      </a:r>
-                    </a:p>
-                  </a:txBody>
-                </a:tc>
-              </a:tr>
-              <a:tr h="395576">
-                <a:tc>
-                  <a:txBody>
-                    <a:bodyPr/>
-                    <a:lstStyle/>
-                    <a:p>
-                      <a:r>
-                        <a:t>United Technologies</a:t>
-                      </a:r>
-                    </a:p>
-                  </a:txBody>
-                </a:tc>
-                <a:tc>
-                  <a:txBody>
-                    <a:bodyPr/>
-                    <a:lstStyle/>
-                    <a:p>
-                      <a:r>
-                        <a:t>UnitedHealth</a:t>
-                      </a:r>
-                    </a:p>
-                  </a:txBody>
-                </a:tc>
-                <a:tc>
-                  <a:txBody>
-                    <a:bodyPr/>
-                    <a:lstStyle/>
-                    <a:p>
-                      <a:r>
-                        <a:t>Verizon</a:t>
-                      </a:r>
-                    </a:p>
-                  </a:txBody>
-                </a:tc>
-              </a:tr>
-              <a:tr h="395576">
-                <a:tc>
-                  <a:txBody>
-                    <a:bodyPr/>
-                    <a:lstStyle/>
-                    <a:p>
-                      <a:r>
-                        <a:t>Visa</a:t>
-                      </a:r>
-                    </a:p>
-                  </a:txBody>
-                </a:tc>
-                <a:tc>
-                  <a:txBody>
-                    <a:bodyPr/>
-                    <a:lstStyle/>
-                    <a:p>
-                      <a:r>
-                        <a:t>Wal-Mart</a:t>
-                      </a:r>
-                    </a:p>
-                  </a:txBody>
-                </a:tc>
-                <a:tc>
-                  <a:txBody>
-                    <a:bodyPr/>
-                    <a:lstStyle/>
-                    <a:p>
-                      <a:r>
-                        <a:t>Walgreen</a:t>
-                      </a:r>
-                    </a:p>
-                  </a:txBody>
-                </a:tc>
-              </a:tr>
-            </a:tbl>
-          </a:graphicData>
-        </a:graphic>
-      </p:graphicFrame>
-      <p:sp xmlns:a="http://schemas.openxmlformats.org/drawingml/2006/main" xmlns:r="http://schemas.openxmlformats.org/officeDocument/2006/relationships" xmlns:p="http://schemas.openxmlformats.org/presentationml/2006/main">
-        <p:nvSpPr>
-          <p:cNvPr id="4" name=""/>
-          <p:cNvSpPr>
-            <a:spLocks noGrp="1"/>
-          </p:cNvSpPr>
-          <p:nvPr>
-            <p:ph type="sldNum" sz="quarter" idx="12"/>
-          </p:nvPr>
-        </p:nvSpPr>
-        <p:spPr>
-          <a:xfrm>
-            <a:off x="6457950" y="6356351"/>
-            <a:ext cx="2057400" cy="365125"/>
-          </a:xfrm>
-        </p:spPr>
-        <p:txBody>
-          <a:bodyPr/>
-          <a:lstStyle/>
-          <a:p>
-            <a:r>
-              <a:rPr/>
-              <a:t>5</a:t>
-            </a:r>
-          </a:p>
-        </p:txBody>
-      </p:sp>
-    </p:spTree>
-  </p:cSld>
-  <p:clrMapOvr>
-    <a:masterClrMapping/>
-  </p:clrMapOvr>
-</p:sld>
-</file>
-
-<file path=ppt/slides/slide6.xml><?xml version="1.0" encoding="utf-8"?>
-<p:sld xmlns:a="http://schemas.openxmlformats.org/drawingml/2006/main" xmlns:r="http://schemas.openxmlformats.org/officeDocument/2006/relationships" xmlns:p="http://schemas.openxmlformats.org/presentationml/2006/main">
-  <p:cSld>
-    <p:spTree>
-      <p:nvGrpSpPr>
-        <p:cNvPr id="1" name=""/>
-        <p:cNvGrpSpPr/>
-        <p:nvPr/>
-      </p:nvGrpSpPr>
-      <p:grpSpPr>
-        <a:xfrm>
-          <a:off x="0" y="0"/>
-          <a:ext cx="0" cy="0"/>
-          <a:chOff x="0" y="0"/>
-          <a:chExt cx="0" cy="0"/>
-        </a:xfrm>
-      </p:grpSpPr>
-      <p:sp xmlns:a="http://schemas.openxmlformats.org/drawingml/2006/main" xmlns:r="http://schemas.openxmlformats.org/officeDocument/2006/relationships" xmlns:p="http://schemas.openxmlformats.org/presentationml/2006/main">
-        <p:nvSpPr>
-          <p:cNvPr id="2" name=""/>
-          <p:cNvSpPr>
-            <a:spLocks noGrp="1"/>
-          </p:cNvSpPr>
-          <p:nvPr>
-            <p:ph type="title"/>
-          </p:nvPr>
-        </p:nvSpPr>
-        <p:spPr>
-          <a:xfrm>
-            <a:off x="628650" y="365126"/>
-            <a:ext cx="7886700" cy="1325563"/>
-          </a:xfrm>
-        </p:spPr>
-        <p:txBody>
-          <a:bodyPr/>
-          <a:lstStyle/>
-          <a:p>
-            <a:r>
-              <a:rPr/>
-              <a:t>Dow Jones</a:t>
-            </a:r>
-          </a:p>
-        </p:txBody>
-      </p:sp>
-      <p:pic xmlns:a="http://schemas.openxmlformats.org/drawingml/2006/main" xmlns:r="http://schemas.openxmlformats.org/officeDocument/2006/relationships" xmlns:p="http://schemas.openxmlformats.org/presentationml/2006/main">
-        <p:nvPicPr>
-          <p:cNvPr id="3" name="pic"/>
-          <p:cNvPicPr/>
-          <p:nvPr/>
-        </p:nvPicPr>
-        <p:blipFill>
-          <a:blip cstate="print" r:embed="rId2"/>
-          <a:stretch>
-            <a:fillRect/>
-          </a:stretch>
-        </p:blipFill>
-        <p:spPr>
-          <a:xfrm>
-            <a:off x="628650" y="1825625"/>
-            <a:ext cx="7886700" cy="4351338"/>
-          </a:xfrm>
-          <a:prstGeom prst="rect">
-            <a:avLst/>
-          </a:prstGeom>
-        </p:spPr>
-      </p:pic>
-      <p:sp xmlns:a="http://schemas.openxmlformats.org/drawingml/2006/main" xmlns:r="http://schemas.openxmlformats.org/officeDocument/2006/relationships" xmlns:p="http://schemas.openxmlformats.org/presentationml/2006/main">
-        <p:nvSpPr>
-          <p:cNvPr id="4" name=""/>
-          <p:cNvSpPr>
-            <a:spLocks noGrp="1"/>
-          </p:cNvSpPr>
-          <p:nvPr>
-            <p:ph type="sldNum" sz="quarter" idx="12"/>
-          </p:nvPr>
-        </p:nvSpPr>
-        <p:spPr>
-          <a:xfrm>
-            <a:off x="6457950" y="6356351"/>
-            <a:ext cx="2057400" cy="365125"/>
-          </a:xfrm>
-        </p:spPr>
-        <p:txBody>
-          <a:bodyPr/>
-          <a:lstStyle/>
-          <a:p>
-            <a:r>
-              <a:rPr/>
-              <a:t>6</a:t>
-            </a:r>
-          </a:p>
-        </p:txBody>
-      </p:sp>
-    </p:spTree>
-  </p:cSld>
-  <p:clrMapOvr>
-    <a:masterClrMapping/>
-  </p:clrMapOvr>
-</p:sld>
-</file>
-
-<file path=ppt/slides/slide7.xml><?xml version="1.0" encoding="utf-8"?>
-<p:sld xmlns:a="http://schemas.openxmlformats.org/drawingml/2006/main" xmlns:r="http://schemas.openxmlformats.org/officeDocument/2006/relationships" xmlns:p="http://schemas.openxmlformats.org/presentationml/2006/main">
-  <p:cSld>
-    <p:spTree>
-      <p:nvGrpSpPr>
-        <p:cNvPr id="1" name=""/>
-        <p:cNvGrpSpPr/>
-        <p:nvPr/>
-      </p:nvGrpSpPr>
-      <p:grpSpPr>
-        <a:xfrm>
-          <a:off x="0" y="0"/>
-          <a:ext cx="0" cy="0"/>
-          <a:chOff x="0" y="0"/>
-          <a:chExt cx="0" cy="0"/>
-        </a:xfrm>
-      </p:grpSpPr>
-      <p:sp xmlns:a="http://schemas.openxmlformats.org/drawingml/2006/main" xmlns:r="http://schemas.openxmlformats.org/officeDocument/2006/relationships" xmlns:p="http://schemas.openxmlformats.org/presentationml/2006/main">
-        <p:nvSpPr>
-          <p:cNvPr id="2" name=""/>
-          <p:cNvSpPr>
-            <a:spLocks noGrp="1"/>
-          </p:cNvSpPr>
-          <p:nvPr>
-            <p:ph type="title"/>
-          </p:nvPr>
-        </p:nvSpPr>
-        <p:spPr>
-          <a:xfrm>
-            <a:off x="628650" y="365126"/>
-            <a:ext cx="7886700" cy="1325563"/>
-          </a:xfrm>
-        </p:spPr>
-        <p:txBody>
-          <a:bodyPr/>
-          <a:lstStyle/>
-          <a:p>
-            <a:r>
-              <a:rPr/>
-              <a:t>The Last Bear Markets</a:t>
-            </a:r>
-          </a:p>
-        </p:txBody>
-      </p:sp>
-      <p:sp xmlns:a="http://schemas.openxmlformats.org/drawingml/2006/main" xmlns:r="http://schemas.openxmlformats.org/officeDocument/2006/relationships" xmlns:p="http://schemas.openxmlformats.org/presentationml/2006/main">
-        <p:nvSpPr>
-          <p:cNvPr id="3" name=""/>
-          <p:cNvSpPr>
-            <a:spLocks noGrp="1"/>
-          </p:cNvSpPr>
-          <p:nvPr>
-            <p:ph idx="1"/>
-          </p:nvPr>
-        </p:nvSpPr>
-        <p:spPr>
-          <a:xfrm>
-            <a:off x="628650" y="1825625"/>
-            <a:ext cx="7886700" cy="4351338"/>
-          </a:xfrm>
-        </p:spPr>
-        <p:txBody>
-          <a:bodyPr/>
-          <a:lstStyle/>
-          <a:p>
-            <a:pPr/>
-            <a:r>
-              <a:rPr/>
-              <a:t>Sept. 30, 2002  Dow 7,528</a:t>
-            </a:r>
-          </a:p>
-          <a:p>
-            <a:pPr/>
-            <a:r>
-              <a:rPr/>
-              <a:t>Jan. 5, 2004    Dow 10,668</a:t>
-            </a:r>
-          </a:p>
-          <a:p>
-            <a:pPr/>
-            <a:r>
-              <a:rPr/>
-              <a:t>Oct. 8, 2007  Dow 14,093</a:t>
-            </a:r>
-          </a:p>
-        </p:txBody>
-      </p:sp>
-      <p:sp xmlns:a="http://schemas.openxmlformats.org/drawingml/2006/main" xmlns:r="http://schemas.openxmlformats.org/officeDocument/2006/relationships" xmlns:p="http://schemas.openxmlformats.org/presentationml/2006/main">
-        <p:nvSpPr>
-          <p:cNvPr id="4" name=""/>
-          <p:cNvSpPr>
-            <a:spLocks noGrp="1"/>
-          </p:cNvSpPr>
-          <p:nvPr>
-            <p:ph type="sldNum" sz="quarter" idx="12"/>
-          </p:nvPr>
-        </p:nvSpPr>
-        <p:spPr>
-          <a:xfrm>
-            <a:off x="6457950" y="6356351"/>
-            <a:ext cx="2057400" cy="365125"/>
-          </a:xfrm>
-        </p:spPr>
-        <p:txBody>
-          <a:bodyPr/>
-          <a:lstStyle/>
-          <a:p>
-            <a:r>
-              <a:rPr/>
-              <a:t>7</a:t>
-            </a:r>
-          </a:p>
-        </p:txBody>
-      </p:sp>
-    </p:spTree>
-  </p:cSld>
-  <p:clrMapOvr>
-    <a:masterClrMapping/>
-  </p:clrMapOvr>
-</p:sld>
-</file>
-
-<file path=ppt/slides/slide8.xml><?xml version="1.0" encoding="utf-8"?>
-<p:sld xmlns:a="http://schemas.openxmlformats.org/drawingml/2006/main" xmlns:r="http://schemas.openxmlformats.org/officeDocument/2006/relationships" xmlns:p="http://schemas.openxmlformats.org/presentationml/2006/main">
-  <p:cSld>
-    <p:spTree>
-      <p:nvGrpSpPr>
-        <p:cNvPr id="1" name=""/>
-        <p:cNvGrpSpPr/>
-        <p:nvPr/>
-      </p:nvGrpSpPr>
-      <p:grpSpPr>
-        <a:xfrm>
-          <a:off x="0" y="0"/>
-          <a:ext cx="0" cy="0"/>
-          <a:chOff x="0" y="0"/>
-          <a:chExt cx="0" cy="0"/>
-        </a:xfrm>
-      </p:grpSpPr>
-      <p:sp xmlns:a="http://schemas.openxmlformats.org/drawingml/2006/main" xmlns:r="http://schemas.openxmlformats.org/officeDocument/2006/relationships" xmlns:p="http://schemas.openxmlformats.org/presentationml/2006/main">
-        <p:nvSpPr>
-          <p:cNvPr id="2" name=""/>
-          <p:cNvSpPr>
-            <a:spLocks noGrp="1"/>
-          </p:cNvSpPr>
-          <p:nvPr>
-            <p:ph type="title"/>
-          </p:nvPr>
-        </p:nvSpPr>
-        <p:spPr>
-          <a:xfrm>
-            <a:off x="628650" y="365126"/>
-            <a:ext cx="7886700" cy="1325563"/>
-          </a:xfrm>
-        </p:spPr>
-        <p:txBody>
-          <a:bodyPr/>
-          <a:lstStyle/>
-          <a:p>
-            <a:r>
-              <a:rPr/>
-              <a:t>What do I do in a Bear Market?</a:t>
-            </a:r>
-          </a:p>
-        </p:txBody>
-      </p:sp>
-      <p:sp xmlns:a="http://schemas.openxmlformats.org/drawingml/2006/main" xmlns:r="http://schemas.openxmlformats.org/officeDocument/2006/relationships" xmlns:p="http://schemas.openxmlformats.org/presentationml/2006/main">
-        <p:nvSpPr>
-          <p:cNvPr id="3" name=""/>
-          <p:cNvSpPr>
-            <a:spLocks noGrp="1"/>
-          </p:cNvSpPr>
-          <p:nvPr>
-            <p:ph idx="1"/>
-          </p:nvPr>
-        </p:nvSpPr>
-        <p:spPr>
-          <a:xfrm>
-            <a:off x="628650" y="1825625"/>
-            <a:ext cx="7886700" cy="4351338"/>
-          </a:xfrm>
-        </p:spPr>
-        <p:txBody>
-          <a:bodyPr/>
-          <a:lstStyle/>
-          <a:p>
-            <a:pPr/>
-            <a:r>
-              <a:rPr/>
-              <a:t>Decide if this is a market correction or the start of something more</a:t>
-            </a:r>
-          </a:p>
-          <a:p>
-            <a:pPr/>
-            <a:r>
-              <a:rPr/>
-              <a:t>Review the stocks you own</a:t>
-            </a:r>
-          </a:p>
-          <a:p>
-            <a:pPr/>
-            <a:r>
-              <a:rPr/>
-              <a:t>Review stocks you wanted to own but were too expensive at time of 
-research</a:t>
-            </a:r>
-          </a:p>
-          <a:p>
-            <a:pPr/>
-            <a:r>
-              <a:rPr/>
-              <a:t>Check your portfolio for balance or the type of stocks you own</a:t>
-            </a:r>
-          </a:p>
-        </p:txBody>
-      </p:sp>
-      <p:sp xmlns:a="http://schemas.openxmlformats.org/drawingml/2006/main" xmlns:r="http://schemas.openxmlformats.org/officeDocument/2006/relationships" xmlns:p="http://schemas.openxmlformats.org/presentationml/2006/main">
-        <p:nvSpPr>
-          <p:cNvPr id="4" name=""/>
-          <p:cNvSpPr>
-            <a:spLocks noGrp="1"/>
-          </p:cNvSpPr>
-          <p:nvPr>
-            <p:ph type="sldNum" sz="quarter" idx="12"/>
-          </p:nvPr>
-        </p:nvSpPr>
-        <p:spPr>
-          <a:xfrm>
-            <a:off x="6457950" y="6356351"/>
-            <a:ext cx="2057400" cy="365125"/>
-          </a:xfrm>
-        </p:spPr>
-        <p:txBody>
-          <a:bodyPr/>
-          <a:lstStyle/>
-          <a:p>
-            <a:r>
-              <a:rPr/>
-              <a:t>8</a:t>
-            </a:r>
-          </a:p>
-        </p:txBody>
-      </p:sp>
-    </p:spTree>
-  </p:cSld>
-  <p:clrMapOvr>
-    <a:masterClrMapping/>
-  </p:clrMapOvr>
-</p:sld>
-</file>
-
 <file path=ppt/theme/theme1.xml><?xml version="1.0" encoding="utf-8"?>
 <a:theme xmlns:a="http://schemas.openxmlformats.org/drawingml/2006/main" name="Office Theme">
   <a:themeElements>

</xml_diff>